<commit_message>
update project management ppt und DataPrep file
</commit_message>
<xml_diff>
--- a/projectManagement/Himalaya Classification .pptx
+++ b/projectManagement/Himalaya Classification .pptx
@@ -11,9 +11,10 @@
     <p:sldId id="259" r:id="rId5"/>
     <p:sldId id="260" r:id="rId6"/>
     <p:sldId id="261" r:id="rId7"/>
-    <p:sldId id="266" r:id="rId8"/>
-    <p:sldId id="267" r:id="rId9"/>
-    <p:sldId id="268" r:id="rId10"/>
+    <p:sldId id="269" r:id="rId8"/>
+    <p:sldId id="266" r:id="rId9"/>
+    <p:sldId id="267" r:id="rId10"/>
+    <p:sldId id="268" r:id="rId11"/>
   </p:sldIdLst>
   <p:sldSz cx="9144000" cy="6858000" type="screen4x3"/>
   <p:notesSz cx="6858000" cy="9144000"/>
@@ -310,7 +311,7 @@
           <a:p>
             <a:fld id="{D6713B80-1A7E-462A-BDE6-E49A89885AE2}" type="datetimeFigureOut">
               <a:rPr lang="de-DE" smtClean="0"/>
-              <a:t>21.01.2020</a:t>
+              <a:t>01.02.20</a:t>
             </a:fld>
             <a:endParaRPr lang="de-DE"/>
           </a:p>
@@ -478,7 +479,7 @@
           <a:p>
             <a:fld id="{D6713B80-1A7E-462A-BDE6-E49A89885AE2}" type="datetimeFigureOut">
               <a:rPr lang="de-DE" smtClean="0"/>
-              <a:t>21.01.2020</a:t>
+              <a:t>01.02.20</a:t>
             </a:fld>
             <a:endParaRPr lang="de-DE"/>
           </a:p>
@@ -656,7 +657,7 @@
           <a:p>
             <a:fld id="{D6713B80-1A7E-462A-BDE6-E49A89885AE2}" type="datetimeFigureOut">
               <a:rPr lang="de-DE" smtClean="0"/>
-              <a:t>21.01.2020</a:t>
+              <a:t>01.02.20</a:t>
             </a:fld>
             <a:endParaRPr lang="de-DE"/>
           </a:p>
@@ -824,7 +825,7 @@
           <a:p>
             <a:fld id="{D6713B80-1A7E-462A-BDE6-E49A89885AE2}" type="datetimeFigureOut">
               <a:rPr lang="de-DE" smtClean="0"/>
-              <a:t>21.01.2020</a:t>
+              <a:t>01.02.20</a:t>
             </a:fld>
             <a:endParaRPr lang="de-DE"/>
           </a:p>
@@ -1069,7 +1070,7 @@
           <a:p>
             <a:fld id="{D6713B80-1A7E-462A-BDE6-E49A89885AE2}" type="datetimeFigureOut">
               <a:rPr lang="de-DE" smtClean="0"/>
-              <a:t>21.01.2020</a:t>
+              <a:t>01.02.20</a:t>
             </a:fld>
             <a:endParaRPr lang="de-DE"/>
           </a:p>
@@ -1354,7 +1355,7 @@
           <a:p>
             <a:fld id="{D6713B80-1A7E-462A-BDE6-E49A89885AE2}" type="datetimeFigureOut">
               <a:rPr lang="de-DE" smtClean="0"/>
-              <a:t>21.01.2020</a:t>
+              <a:t>01.02.20</a:t>
             </a:fld>
             <a:endParaRPr lang="de-DE"/>
           </a:p>
@@ -1773,7 +1774,7 @@
           <a:p>
             <a:fld id="{D6713B80-1A7E-462A-BDE6-E49A89885AE2}" type="datetimeFigureOut">
               <a:rPr lang="de-DE" smtClean="0"/>
-              <a:t>21.01.2020</a:t>
+              <a:t>01.02.20</a:t>
             </a:fld>
             <a:endParaRPr lang="de-DE"/>
           </a:p>
@@ -1890,7 +1891,7 @@
           <a:p>
             <a:fld id="{D6713B80-1A7E-462A-BDE6-E49A89885AE2}" type="datetimeFigureOut">
               <a:rPr lang="de-DE" smtClean="0"/>
-              <a:t>21.01.2020</a:t>
+              <a:t>01.02.20</a:t>
             </a:fld>
             <a:endParaRPr lang="de-DE"/>
           </a:p>
@@ -1985,7 +1986,7 @@
           <a:p>
             <a:fld id="{D6713B80-1A7E-462A-BDE6-E49A89885AE2}" type="datetimeFigureOut">
               <a:rPr lang="de-DE" smtClean="0"/>
-              <a:t>21.01.2020</a:t>
+              <a:t>01.02.20</a:t>
             </a:fld>
             <a:endParaRPr lang="de-DE"/>
           </a:p>
@@ -2260,7 +2261,7 @@
           <a:p>
             <a:fld id="{D6713B80-1A7E-462A-BDE6-E49A89885AE2}" type="datetimeFigureOut">
               <a:rPr lang="de-DE" smtClean="0"/>
-              <a:t>21.01.2020</a:t>
+              <a:t>01.02.20</a:t>
             </a:fld>
             <a:endParaRPr lang="de-DE"/>
           </a:p>
@@ -2512,7 +2513,7 @@
           <a:p>
             <a:fld id="{D6713B80-1A7E-462A-BDE6-E49A89885AE2}" type="datetimeFigureOut">
               <a:rPr lang="de-DE" smtClean="0"/>
-              <a:t>21.01.2020</a:t>
+              <a:t>01.02.20</a:t>
             </a:fld>
             <a:endParaRPr lang="de-DE"/>
           </a:p>
@@ -2723,7 +2724,7 @@
           <a:p>
             <a:fld id="{D6713B80-1A7E-462A-BDE6-E49A89885AE2}" type="datetimeFigureOut">
               <a:rPr lang="de-DE" smtClean="0"/>
-              <a:t>21.01.2020</a:t>
+              <a:t>01.02.20</a:t>
             </a:fld>
             <a:endParaRPr lang="de-DE"/>
           </a:p>
@@ -3157,6 +3158,155 @@
 </p:sld>
 </file>
 
+<file path=ppt/slides/slide10.xml><?xml version="1.0" encoding="utf-8"?>
+<p:sld xmlns:a="http://schemas.openxmlformats.org/drawingml/2006/main" xmlns:r="http://schemas.openxmlformats.org/officeDocument/2006/relationships" xmlns:p="http://schemas.openxmlformats.org/presentationml/2006/main">
+  <p:cSld>
+    <p:spTree>
+      <p:nvGrpSpPr>
+        <p:cNvPr id="1" name=""/>
+        <p:cNvGrpSpPr/>
+        <p:nvPr/>
+      </p:nvGrpSpPr>
+      <p:grpSpPr>
+        <a:xfrm>
+          <a:off x="0" y="0"/>
+          <a:ext cx="0" cy="0"/>
+          <a:chOff x="0" y="0"/>
+          <a:chExt cx="0" cy="0"/>
+        </a:xfrm>
+      </p:grpSpPr>
+      <p:sp>
+        <p:nvSpPr>
+          <p:cNvPr id="2" name="Titel 1"/>
+          <p:cNvSpPr>
+            <a:spLocks noGrp="1"/>
+          </p:cNvSpPr>
+          <p:nvPr>
+            <p:ph type="title"/>
+          </p:nvPr>
+        </p:nvSpPr>
+        <p:spPr/>
+        <p:txBody>
+          <a:bodyPr>
+            <a:normAutofit fontScale="90000"/>
+          </a:bodyPr>
+          <a:lstStyle/>
+          <a:p>
+            <a:r>
+              <a:rPr lang="de-DE" dirty="0"/>
+              <a:t>Analysis</a:t>
+            </a:r>
+            <a:br>
+              <a:rPr lang="de-DE" dirty="0"/>
+            </a:br>
+            <a:r>
+              <a:rPr lang="de-DE" dirty="0"/>
+              <a:t>3.2 </a:t>
+            </a:r>
+            <a:r>
+              <a:rPr lang="de-DE" dirty="0" err="1"/>
+              <a:t>Results</a:t>
+            </a:r>
+            <a:r>
+              <a:rPr lang="de-DE" dirty="0"/>
+              <a:t> Präsentation (beide, </a:t>
+            </a:r>
+            <a:r>
+              <a:rPr lang="de-DE" dirty="0" err="1"/>
+              <a:t>Präs</a:t>
+            </a:r>
+            <a:r>
+              <a:rPr lang="de-DE" dirty="0"/>
+              <a:t>. Philipp)</a:t>
+            </a:r>
+          </a:p>
+        </p:txBody>
+      </p:sp>
+      <p:sp>
+        <p:nvSpPr>
+          <p:cNvPr id="3" name="Inhaltsplatzhalter 2"/>
+          <p:cNvSpPr>
+            <a:spLocks noGrp="1"/>
+          </p:cNvSpPr>
+          <p:nvPr>
+            <p:ph idx="1"/>
+          </p:nvPr>
+        </p:nvSpPr>
+        <p:spPr/>
+        <p:txBody>
+          <a:bodyPr/>
+          <a:lstStyle/>
+          <a:p>
+            <a:r>
+              <a:rPr lang="de-DE" dirty="0"/>
+              <a:t>Klassifikationsmatrix</a:t>
+            </a:r>
+          </a:p>
+          <a:p>
+            <a:r>
+              <a:rPr lang="de-DE" dirty="0"/>
+              <a:t>Überlegen ob Precision, Recall nützlich</a:t>
+            </a:r>
+          </a:p>
+          <a:p>
+            <a:r>
+              <a:rPr lang="de-DE" dirty="0"/>
+              <a:t>Interpretation in Business </a:t>
+            </a:r>
+            <a:r>
+              <a:rPr lang="de-DE" dirty="0" err="1"/>
+              <a:t>case</a:t>
+            </a:r>
+            <a:r>
+              <a:rPr lang="de-DE" dirty="0"/>
+              <a:t>?</a:t>
+            </a:r>
+          </a:p>
+          <a:p>
+            <a:r>
+              <a:rPr lang="de-DE" dirty="0" err="1"/>
+              <a:t>Bspw</a:t>
+            </a:r>
+            <a:r>
+              <a:rPr lang="de-DE" dirty="0"/>
+              <a:t> x * Summe an Beiträgen, davon 2,7% Schadensfall = x*2,7 mal Auszahlungsbetrag</a:t>
+            </a:r>
+          </a:p>
+          <a:p>
+            <a:r>
+              <a:rPr lang="de-DE" dirty="0"/>
+              <a:t>Ggf. </a:t>
+            </a:r>
+            <a:r>
+              <a:rPr lang="de-DE" dirty="0" err="1"/>
+              <a:t>ermittlen</a:t>
+            </a:r>
+            <a:r>
+              <a:rPr lang="de-DE" dirty="0"/>
+              <a:t>, was so eine Versicherung wirklich kostet</a:t>
+            </a:r>
+          </a:p>
+          <a:p>
+            <a:r>
+              <a:rPr lang="de-DE" dirty="0"/>
+              <a:t>Vertriebsvorgabe o. ä.</a:t>
+            </a:r>
+          </a:p>
+        </p:txBody>
+      </p:sp>
+    </p:spTree>
+    <p:extLst>
+      <p:ext uri="{BB962C8B-B14F-4D97-AF65-F5344CB8AC3E}">
+        <p14:creationId xmlns:p14="http://schemas.microsoft.com/office/powerpoint/2010/main" val="2500142338"/>
+      </p:ext>
+    </p:extLst>
+  </p:cSld>
+  <p:clrMapOvr>
+    <a:masterClrMapping/>
+  </p:clrMapOvr>
+</p:sld>
+</file>
+
 <file path=ppt/slides/slide2.xml><?xml version="1.0" encoding="utf-8"?>
 <p:sld xmlns:a="http://schemas.openxmlformats.org/drawingml/2006/main" xmlns:r="http://schemas.openxmlformats.org/officeDocument/2006/relationships" xmlns:p="http://schemas.openxmlformats.org/presentationml/2006/main">
   <p:cSld>
@@ -3871,46 +4021,72 @@
       </p:grpSpPr>
       <p:sp>
         <p:nvSpPr>
-          <p:cNvPr id="2" name="Titel 1"/>
-          <p:cNvSpPr>
-            <a:spLocks noGrp="1"/>
-          </p:cNvSpPr>
-          <p:nvPr>
-            <p:ph type="title"/>
-          </p:nvPr>
-        </p:nvSpPr>
-        <p:spPr/>
-        <p:txBody>
-          <a:bodyPr>
-            <a:normAutofit fontScale="90000"/>
+          <p:cNvPr id="5" name="Titel 1"/>
+          <p:cNvSpPr txBox="1">
+            <a:spLocks/>
+          </p:cNvSpPr>
+          <p:nvPr/>
+        </p:nvSpPr>
+        <p:spPr>
+          <a:xfrm>
+            <a:off x="457200" y="116632"/>
+            <a:ext cx="8229600" cy="1143000"/>
+          </a:xfrm>
+          <a:prstGeom prst="rect">
+            <a:avLst/>
+          </a:prstGeom>
+        </p:spPr>
+        <p:txBody>
+          <a:bodyPr vert="horz" lIns="91440" tIns="45720" rIns="91440" bIns="45720" rtlCol="0" anchor="ctr">
+            <a:normAutofit fontScale="92500" lnSpcReduction="20000"/>
           </a:bodyPr>
-          <a:lstStyle/>
+          <a:lstStyle>
+            <a:lvl1pPr algn="ctr" defTabSz="914400" rtl="0" eaLnBrk="1" latinLnBrk="0" hangingPunct="1">
+              <a:spcBef>
+                <a:spcPct val="0"/>
+              </a:spcBef>
+              <a:buNone/>
+              <a:defRPr sz="4400" kern="1200">
+                <a:solidFill>
+                  <a:schemeClr val="tx1"/>
+                </a:solidFill>
+                <a:latin typeface="+mj-lt"/>
+                <a:ea typeface="+mj-ea"/>
+                <a:cs typeface="+mj-cs"/>
+              </a:defRPr>
+            </a:lvl1pPr>
+          </a:lstStyle>
           <a:p>
             <a:r>
               <a:rPr lang="de-DE" dirty="0"/>
               <a:t>Implementation</a:t>
             </a:r>
-            <a:br>
-              <a:rPr lang="de-DE" dirty="0"/>
-            </a:br>
-            <a:r>
-              <a:rPr lang="de-DE" dirty="0"/>
-              <a:t>2.2 Modeling (beide, </a:t>
+          </a:p>
+          <a:p>
+            <a:r>
+              <a:rPr lang="de-DE" dirty="0"/>
+              <a:t>2.1 Data </a:t>
             </a:r>
             <a:r>
               <a:rPr lang="de-DE" dirty="0" err="1"/>
-              <a:t>Präs</a:t>
-            </a:r>
-            <a:r>
-              <a:rPr lang="de-DE" dirty="0"/>
-              <a:t>. Felix)</a:t>
-            </a:r>
-          </a:p>
-        </p:txBody>
-      </p:sp>
-      <p:sp>
-        <p:nvSpPr>
-          <p:cNvPr id="3" name="Inhaltsplatzhalter 2"/>
+              <a:t>Preparation</a:t>
+            </a:r>
+            <a:r>
+              <a:rPr lang="de-DE" dirty="0"/>
+              <a:t> (Philipp)</a:t>
+            </a:r>
+          </a:p>
+        </p:txBody>
+      </p:sp>
+      <p:sp>
+        <p:nvSpPr>
+          <p:cNvPr id="2" name="Inhaltsplatzhalter 1">
+            <a:extLst>
+              <a:ext uri="{FF2B5EF4-FFF2-40B4-BE49-F238E27FC236}">
+                <a16:creationId xmlns:a16="http://schemas.microsoft.com/office/drawing/2014/main" id="{019D0292-9C42-4844-9279-67EB82146599}"/>
+              </a:ext>
+            </a:extLst>
+          </p:cNvPr>
           <p:cNvSpPr>
             <a:spLocks noGrp="1"/>
           </p:cNvSpPr>
@@ -3918,19 +4094,91 @@
             <p:ph idx="1"/>
           </p:nvPr>
         </p:nvSpPr>
-        <p:spPr/>
-        <p:txBody>
-          <a:bodyPr/>
-          <a:lstStyle/>
-          <a:p>
-            <a:endParaRPr lang="de-DE"/>
+        <p:spPr>
+          <a:xfrm>
+            <a:off x="457200" y="1556792"/>
+            <a:ext cx="8229600" cy="4525963"/>
+          </a:xfrm>
+        </p:spPr>
+        <p:txBody>
+          <a:bodyPr/>
+          <a:lstStyle/>
+          <a:p>
+            <a:r>
+              <a:rPr lang="de-DE" dirty="0"/>
+              <a:t>2.1.1	Altersgruppen – </a:t>
+            </a:r>
+            <a:r>
+              <a:rPr lang="de-DE" dirty="0">
+                <a:solidFill>
+                  <a:srgbClr val="00B050"/>
+                </a:solidFill>
+              </a:rPr>
+              <a:t>erledigt</a:t>
+            </a:r>
+          </a:p>
+          <a:p>
+            <a:r>
+              <a:rPr lang="de-DE" dirty="0"/>
+              <a:t>2.1.2	Codierung der erklärten Variable </a:t>
+            </a:r>
+            <a:r>
+              <a:rPr lang="de-DE" dirty="0">
+                <a:solidFill>
+                  <a:srgbClr val="FF0000"/>
+                </a:solidFill>
+              </a:rPr>
+              <a:t>offen</a:t>
+            </a:r>
+          </a:p>
+          <a:p>
+            <a:r>
+              <a:rPr lang="de-DE" dirty="0"/>
+              <a:t>2.1.3	Berechnung der Erfahrung - </a:t>
+            </a:r>
+            <a:r>
+              <a:rPr lang="de-DE" dirty="0">
+                <a:solidFill>
+                  <a:srgbClr val="00B050"/>
+                </a:solidFill>
+              </a:rPr>
+              <a:t>erledigt</a:t>
+            </a:r>
+          </a:p>
+          <a:p>
+            <a:r>
+              <a:rPr lang="de-DE" dirty="0"/>
+              <a:t>2.1.4	Löschen nicht benötigter Variablen </a:t>
+            </a:r>
+            <a:r>
+              <a:rPr lang="de-DE" dirty="0">
+                <a:solidFill>
+                  <a:srgbClr val="FF0000"/>
+                </a:solidFill>
+              </a:rPr>
+              <a:t>offen</a:t>
+            </a:r>
+          </a:p>
+          <a:p>
+            <a:r>
+              <a:rPr lang="de-DE" dirty="0"/>
+              <a:t>2.1.5	Welche Variablen sind für DT überhaupt nützlich? (Verfahren o. ä.) </a:t>
+            </a:r>
+            <a:r>
+              <a:rPr lang="de-DE" dirty="0">
+                <a:solidFill>
+                  <a:srgbClr val="FF0000"/>
+                </a:solidFill>
+              </a:rPr>
+              <a:t>offen</a:t>
+            </a:r>
           </a:p>
         </p:txBody>
       </p:sp>
     </p:spTree>
     <p:extLst>
       <p:ext uri="{BB962C8B-B14F-4D97-AF65-F5344CB8AC3E}">
-        <p14:creationId xmlns:p14="http://schemas.microsoft.com/office/powerpoint/2010/main" val="3428117280"/>
+        <p14:creationId xmlns:p14="http://schemas.microsoft.com/office/powerpoint/2010/main" val="933240072"/>
       </p:ext>
     </p:extLst>
   </p:cSld>
@@ -3976,22 +4224,14 @@
           <a:p>
             <a:r>
               <a:rPr lang="de-DE" dirty="0"/>
-              <a:t>Analysis</a:t>
+              <a:t>Implementation</a:t>
             </a:r>
             <a:br>
               <a:rPr lang="de-DE" dirty="0"/>
             </a:br>
             <a:r>
               <a:rPr lang="de-DE" dirty="0"/>
-              <a:t>3.1 Model </a:t>
-            </a:r>
-            <a:r>
-              <a:rPr lang="de-DE" dirty="0" err="1"/>
-              <a:t>evaluation</a:t>
-            </a:r>
-            <a:r>
-              <a:rPr lang="de-DE" dirty="0"/>
-              <a:t> (beide, </a:t>
+              <a:t>2.2 Modeling (beide, </a:t>
             </a:r>
             <a:r>
               <a:rPr lang="de-DE" dirty="0" err="1"/>
@@ -4026,7 +4266,7 @@
     </p:spTree>
     <p:extLst>
       <p:ext uri="{BB962C8B-B14F-4D97-AF65-F5344CB8AC3E}">
-        <p14:creationId xmlns:p14="http://schemas.microsoft.com/office/powerpoint/2010/main" val="2414500171"/>
+        <p14:creationId xmlns:p14="http://schemas.microsoft.com/office/powerpoint/2010/main" val="3428117280"/>
       </p:ext>
     </p:extLst>
   </p:cSld>
@@ -4079,15 +4319,15 @@
             </a:br>
             <a:r>
               <a:rPr lang="de-DE" dirty="0"/>
-              <a:t>3.2 </a:t>
+              <a:t>3.1 Model </a:t>
             </a:r>
             <a:r>
               <a:rPr lang="de-DE" dirty="0" err="1"/>
-              <a:t>Results</a:t>
-            </a:r>
-            <a:r>
-              <a:rPr lang="de-DE" dirty="0"/>
-              <a:t> Präsentation (beide, </a:t>
+              <a:t>evaluation</a:t>
+            </a:r>
+            <a:r>
+              <a:rPr lang="de-DE" dirty="0"/>
+              <a:t> (beide, </a:t>
             </a:r>
             <a:r>
               <a:rPr lang="de-DE" dirty="0" err="1"/>
@@ -4095,7 +4335,7 @@
             </a:r>
             <a:r>
               <a:rPr lang="de-DE" dirty="0"/>
-              <a:t>. Philipp)</a:t>
+              <a:t>. Felix)</a:t>
             </a:r>
           </a:p>
         </p:txBody>
@@ -4115,67 +4355,14 @@
           <a:bodyPr/>
           <a:lstStyle/>
           <a:p>
-            <a:r>
-              <a:rPr lang="de-DE" dirty="0"/>
-              <a:t>Klassifikationsmatrix</a:t>
-            </a:r>
-          </a:p>
-          <a:p>
-            <a:r>
-              <a:rPr lang="de-DE" dirty="0"/>
-              <a:t>Überlegen ob Precision, Recall nützlich</a:t>
-            </a:r>
-          </a:p>
-          <a:p>
-            <a:r>
-              <a:rPr lang="de-DE" dirty="0"/>
-              <a:t>Interpretation in Business </a:t>
-            </a:r>
-            <a:r>
-              <a:rPr lang="de-DE" dirty="0" err="1"/>
-              <a:t>case</a:t>
-            </a:r>
-            <a:r>
-              <a:rPr lang="de-DE" dirty="0"/>
-              <a:t>?</a:t>
-            </a:r>
-          </a:p>
-          <a:p>
-            <a:r>
-              <a:rPr lang="de-DE" dirty="0" err="1"/>
-              <a:t>Bspw</a:t>
-            </a:r>
-            <a:r>
-              <a:rPr lang="de-DE" dirty="0"/>
-              <a:t> x * Summe an Beiträgen, davon 2,7% Schadensfall = x*2,7 mal Auszahlungsbetrag</a:t>
-            </a:r>
-          </a:p>
-          <a:p>
-            <a:r>
-              <a:rPr lang="de-DE" dirty="0"/>
-              <a:t>Ggf. </a:t>
-            </a:r>
-            <a:r>
-              <a:rPr lang="de-DE" dirty="0" err="1"/>
-              <a:t>ermittlen</a:t>
-            </a:r>
-            <a:r>
-              <a:rPr lang="de-DE" dirty="0"/>
-              <a:t>, was so eine Versicherung wirklich kostet</a:t>
-            </a:r>
-          </a:p>
-          <a:p>
-            <a:r>
-              <a:rPr lang="de-DE" dirty="0"/>
-              <a:t>Vertriebsvorgabe o. ä.</a:t>
-            </a:r>
+            <a:endParaRPr lang="de-DE"/>
           </a:p>
         </p:txBody>
       </p:sp>
     </p:spTree>
     <p:extLst>
       <p:ext uri="{BB962C8B-B14F-4D97-AF65-F5344CB8AC3E}">
-        <p14:creationId xmlns:p14="http://schemas.microsoft.com/office/powerpoint/2010/main" val="2500142338"/>
+        <p14:creationId xmlns:p14="http://schemas.microsoft.com/office/powerpoint/2010/main" val="2414500171"/>
       </p:ext>
     </p:extLst>
   </p:cSld>

</xml_diff>